<commit_message>
pptx added link to training kit. and other references at the developer center.
</commit_message>
<xml_diff>
--- a/Day 2/8. Day 2 WrapUp/Day 2 WrapUp.pptx
+++ b/Day 2/8. Day 2 WrapUp/Day 2 WrapUp.pptx
@@ -6,20 +6,21 @@
     <p:sldMasterId id="2147483680" r:id="rId2"/>
   </p:sldMasterIdLst>
   <p:notesMasterIdLst>
-    <p:notesMasterId r:id="rId14"/>
+    <p:notesMasterId r:id="rId15"/>
   </p:notesMasterIdLst>
   <p:sldIdLst>
     <p:sldId id="263" r:id="rId3"/>
     <p:sldId id="264" r:id="rId4"/>
     <p:sldId id="275" r:id="rId5"/>
-    <p:sldId id="277" r:id="rId6"/>
-    <p:sldId id="281" r:id="rId7"/>
-    <p:sldId id="278" r:id="rId8"/>
-    <p:sldId id="280" r:id="rId9"/>
-    <p:sldId id="276" r:id="rId10"/>
-    <p:sldId id="271" r:id="rId11"/>
-    <p:sldId id="274" r:id="rId12"/>
-    <p:sldId id="272" r:id="rId13"/>
+    <p:sldId id="282" r:id="rId6"/>
+    <p:sldId id="277" r:id="rId7"/>
+    <p:sldId id="281" r:id="rId8"/>
+    <p:sldId id="278" r:id="rId9"/>
+    <p:sldId id="280" r:id="rId10"/>
+    <p:sldId id="276" r:id="rId11"/>
+    <p:sldId id="271" r:id="rId12"/>
+    <p:sldId id="274" r:id="rId13"/>
+    <p:sldId id="272" r:id="rId14"/>
   </p:sldIdLst>
   <p:sldSz cx="12192000" cy="6858000"/>
   <p:notesSz cx="6858000" cy="9144000"/>
@@ -208,7 +209,7 @@
           <a:p>
             <a:fld id="{C3D5DD48-A958-4081-9BCA-FC35F1C86DBF}" type="datetimeFigureOut">
               <a:rPr lang="en-US" smtClean="0"/>
-              <a:t>10/8/2013</a:t>
+              <a:t>11/18/2013</a:t>
             </a:fld>
             <a:endParaRPr lang="en-US"/>
           </a:p>
@@ -596,6 +597,99 @@
             <p:ph type="sldImg"/>
           </p:nvPr>
         </p:nvSpPr>
+        <p:spPr/>
+      </p:sp>
+      <p:sp>
+        <p:nvSpPr>
+          <p:cNvPr id="3" name="Notes Placeholder 2"/>
+          <p:cNvSpPr>
+            <a:spLocks noGrp="1"/>
+          </p:cNvSpPr>
+          <p:nvPr>
+            <p:ph type="body" idx="1"/>
+          </p:nvPr>
+        </p:nvSpPr>
+        <p:spPr/>
+        <p:txBody>
+          <a:bodyPr/>
+          <a:lstStyle/>
+          <a:p>
+            <a:endParaRPr lang="en-US" dirty="0"/>
+          </a:p>
+        </p:txBody>
+      </p:sp>
+      <p:sp>
+        <p:nvSpPr>
+          <p:cNvPr id="4" name="Slide Number Placeholder 3"/>
+          <p:cNvSpPr>
+            <a:spLocks noGrp="1"/>
+          </p:cNvSpPr>
+          <p:nvPr>
+            <p:ph type="sldNum" sz="quarter" idx="10"/>
+          </p:nvPr>
+        </p:nvSpPr>
+        <p:spPr/>
+        <p:txBody>
+          <a:bodyPr/>
+          <a:lstStyle/>
+          <a:p>
+            <a:fld id="{82AABF77-E2E4-44CA-BA5C-65E132CF08D8}" type="slidenum">
+              <a:rPr lang="en-US" smtClean="0">
+                <a:solidFill>
+                  <a:prstClr val="black"/>
+                </a:solidFill>
+              </a:rPr>
+              <a:pPr/>
+              <a:t>11</a:t>
+            </a:fld>
+            <a:endParaRPr lang="en-US" dirty="0">
+              <a:solidFill>
+                <a:prstClr val="black"/>
+              </a:solidFill>
+            </a:endParaRPr>
+          </a:p>
+        </p:txBody>
+      </p:sp>
+    </p:spTree>
+    <p:extLst>
+      <p:ext uri="{BB962C8B-B14F-4D97-AF65-F5344CB8AC3E}">
+        <p14:creationId xmlns:p14="http://schemas.microsoft.com/office/powerpoint/2010/main" val="154529736"/>
+      </p:ext>
+    </p:extLst>
+  </p:cSld>
+  <p:clrMapOvr>
+    <a:masterClrMapping/>
+  </p:clrMapOvr>
+</p:notes>
+</file>
+
+<file path=ppt/notesSlides/notesSlide11.xml><?xml version="1.0" encoding="utf-8"?>
+<p:notes xmlns:a="http://schemas.openxmlformats.org/drawingml/2006/main" xmlns:r="http://schemas.openxmlformats.org/officeDocument/2006/relationships" xmlns:p="http://schemas.openxmlformats.org/presentationml/2006/main">
+  <p:cSld>
+    <p:spTree>
+      <p:nvGrpSpPr>
+        <p:cNvPr id="1" name=""/>
+        <p:cNvGrpSpPr/>
+        <p:nvPr/>
+      </p:nvGrpSpPr>
+      <p:grpSpPr>
+        <a:xfrm>
+          <a:off x="0" y="0"/>
+          <a:ext cx="0" cy="0"/>
+          <a:chOff x="0" y="0"/>
+          <a:chExt cx="0" cy="0"/>
+        </a:xfrm>
+      </p:grpSpPr>
+      <p:sp>
+        <p:nvSpPr>
+          <p:cNvPr id="2" name="Slide Image Placeholder 1"/>
+          <p:cNvSpPr>
+            <a:spLocks noGrp="1" noRot="1" noChangeAspect="1"/>
+          </p:cNvSpPr>
+          <p:nvPr>
+            <p:ph type="sldImg"/>
+          </p:nvPr>
+        </p:nvSpPr>
         <p:spPr>
           <a:xfrm>
             <a:off x="381000" y="685800"/>
@@ -646,7 +740,7 @@
                 </a:solidFill>
               </a:rPr>
               <a:pPr/>
-              <a:t>10/8/2013</a:t>
+              <a:t>11/18/2013</a:t>
             </a:fld>
             <a:endParaRPr lang="en-US" dirty="0">
               <a:solidFill>
@@ -738,7 +832,7 @@
                 </a:solidFill>
               </a:rPr>
               <a:pPr/>
-              <a:t>11</a:t>
+              <a:t>12</a:t>
             </a:fld>
             <a:endParaRPr lang="en-US" dirty="0">
               <a:solidFill>
@@ -1034,7 +1128,7 @@
           <a:p>
             <a:fld id="{763EEC4F-15FD-4DD0-B0F4-B4A50A18A20A}" type="slidenum">
               <a:rPr lang="en-US" smtClean="0"/>
-              <a:t>5</a:t>
+              <a:t>4</a:t>
             </a:fld>
             <a:endParaRPr lang="en-US"/>
           </a:p>
@@ -1043,7 +1137,7 @@
     </p:spTree>
     <p:extLst>
       <p:ext uri="{BB962C8B-B14F-4D97-AF65-F5344CB8AC3E}">
-        <p14:creationId xmlns:p14="http://schemas.microsoft.com/office/powerpoint/2010/main" val="1778300298"/>
+        <p14:creationId xmlns:p14="http://schemas.microsoft.com/office/powerpoint/2010/main" val="505919126"/>
       </p:ext>
     </p:extLst>
   </p:cSld>
@@ -1097,10 +1191,6 @@
           <a:bodyPr/>
           <a:lstStyle/>
           <a:p>
-            <a:r>
-              <a:rPr lang="en-US" dirty="0" smtClean="0"/>
-              <a:t>What MSR is doing</a:t>
-            </a:r>
             <a:endParaRPr lang="en-US" dirty="0"/>
           </a:p>
         </p:txBody>
@@ -1131,7 +1221,7 @@
     </p:spTree>
     <p:extLst>
       <p:ext uri="{BB962C8B-B14F-4D97-AF65-F5344CB8AC3E}">
-        <p14:creationId xmlns:p14="http://schemas.microsoft.com/office/powerpoint/2010/main" val="3407419820"/>
+        <p14:creationId xmlns:p14="http://schemas.microsoft.com/office/powerpoint/2010/main" val="1778300298"/>
       </p:ext>
     </p:extLst>
   </p:cSld>
@@ -1187,11 +1277,7 @@
           <a:p>
             <a:r>
               <a:rPr lang="en-US" dirty="0" smtClean="0"/>
-              <a:t>By default, send people here – URL</a:t>
-            </a:r>
-            <a:r>
-              <a:rPr lang="en-US" baseline="0" dirty="0" smtClean="0"/>
-              <a:t> for the previous slide</a:t>
+              <a:t>What MSR is doing</a:t>
             </a:r>
             <a:endParaRPr lang="en-US" dirty="0"/>
           </a:p>
@@ -1212,27 +1298,18 @@
           <a:bodyPr/>
           <a:lstStyle/>
           <a:p>
-            <a:fld id="{94A25E58-20C3-47A2-B67C-8A1FCB5D4422}" type="slidenum">
-              <a:rPr lang="en-US">
-                <a:solidFill>
-                  <a:prstClr val="black"/>
-                </a:solidFill>
-              </a:rPr>
-              <a:pPr/>
+            <a:fld id="{763EEC4F-15FD-4DD0-B0F4-B4A50A18A20A}" type="slidenum">
+              <a:rPr lang="en-US" smtClean="0"/>
               <a:t>7</a:t>
             </a:fld>
-            <a:endParaRPr lang="en-US">
-              <a:solidFill>
-                <a:prstClr val="black"/>
-              </a:solidFill>
-            </a:endParaRPr>
+            <a:endParaRPr lang="en-US"/>
           </a:p>
         </p:txBody>
       </p:sp>
     </p:spTree>
     <p:extLst>
       <p:ext uri="{BB962C8B-B14F-4D97-AF65-F5344CB8AC3E}">
-        <p14:creationId xmlns:p14="http://schemas.microsoft.com/office/powerpoint/2010/main" val="1641441421"/>
+        <p14:creationId xmlns:p14="http://schemas.microsoft.com/office/powerpoint/2010/main" val="3407419820"/>
       </p:ext>
     </p:extLst>
   </p:cSld>
@@ -1286,6 +1363,14 @@
           <a:bodyPr/>
           <a:lstStyle/>
           <a:p>
+            <a:r>
+              <a:rPr lang="en-US" dirty="0" smtClean="0"/>
+              <a:t>By default, send people here – URL</a:t>
+            </a:r>
+            <a:r>
+              <a:rPr lang="en-US" baseline="0" dirty="0" smtClean="0"/>
+              <a:t> for the previous slide</a:t>
+            </a:r>
             <a:endParaRPr lang="en-US" dirty="0"/>
           </a:p>
         </p:txBody>
@@ -1325,7 +1410,7 @@
     </p:spTree>
     <p:extLst>
       <p:ext uri="{BB962C8B-B14F-4D97-AF65-F5344CB8AC3E}">
-        <p14:creationId xmlns:p14="http://schemas.microsoft.com/office/powerpoint/2010/main" val="1546730221"/>
+        <p14:creationId xmlns:p14="http://schemas.microsoft.com/office/powerpoint/2010/main" val="1641441421"/>
       </p:ext>
     </p:extLst>
   </p:cSld>
@@ -1418,7 +1503,7 @@
     </p:spTree>
     <p:extLst>
       <p:ext uri="{BB962C8B-B14F-4D97-AF65-F5344CB8AC3E}">
-        <p14:creationId xmlns:p14="http://schemas.microsoft.com/office/powerpoint/2010/main" val="937686361"/>
+        <p14:creationId xmlns:p14="http://schemas.microsoft.com/office/powerpoint/2010/main" val="1546730221"/>
       </p:ext>
     </p:extLst>
   </p:cSld>
@@ -1491,8 +1576,8 @@
           <a:bodyPr/>
           <a:lstStyle/>
           <a:p>
-            <a:fld id="{82AABF77-E2E4-44CA-BA5C-65E132CF08D8}" type="slidenum">
-              <a:rPr lang="en-US" smtClean="0">
+            <a:fld id="{94A25E58-20C3-47A2-B67C-8A1FCB5D4422}" type="slidenum">
+              <a:rPr lang="en-US">
                 <a:solidFill>
                   <a:prstClr val="black"/>
                 </a:solidFill>
@@ -1500,7 +1585,7 @@
               <a:pPr/>
               <a:t>10</a:t>
             </a:fld>
-            <a:endParaRPr lang="en-US" dirty="0">
+            <a:endParaRPr lang="en-US">
               <a:solidFill>
                 <a:prstClr val="black"/>
               </a:solidFill>
@@ -1511,7 +1596,7 @@
     </p:spTree>
     <p:extLst>
       <p:ext uri="{BB962C8B-B14F-4D97-AF65-F5344CB8AC3E}">
-        <p14:creationId xmlns:p14="http://schemas.microsoft.com/office/powerpoint/2010/main" val="154529736"/>
+        <p14:creationId xmlns:p14="http://schemas.microsoft.com/office/powerpoint/2010/main" val="937686361"/>
       </p:ext>
     </p:extLst>
   </p:cSld>
@@ -19621,6 +19706,105 @@
       </p:grpSpPr>
       <p:sp>
         <p:nvSpPr>
+          <p:cNvPr id="5" name="Title 4"/>
+          <p:cNvSpPr>
+            <a:spLocks noGrp="1"/>
+          </p:cNvSpPr>
+          <p:nvPr>
+            <p:ph type="ctrTitle"/>
+          </p:nvPr>
+        </p:nvSpPr>
+        <p:spPr>
+          <a:xfrm>
+            <a:off x="519249" y="3282328"/>
+            <a:ext cx="8375702" cy="1359196"/>
+          </a:xfrm>
+        </p:spPr>
+        <p:txBody>
+          <a:bodyPr/>
+          <a:lstStyle/>
+          <a:p>
+            <a:r>
+              <a:rPr lang="en-US" dirty="0" smtClean="0"/>
+              <a:t>Any final </a:t>
+            </a:r>
+            <a:r>
+              <a:rPr lang="en-US" dirty="0"/>
+              <a:t>q</a:t>
+            </a:r>
+            <a:r>
+              <a:rPr lang="en-US" dirty="0" smtClean="0"/>
+              <a:t>uestions?</a:t>
+            </a:r>
+            <a:br>
+              <a:rPr lang="en-US" dirty="0" smtClean="0"/>
+            </a:br>
+            <a:r>
+              <a:rPr lang="en-US" dirty="0"/>
+              <a:t/>
+            </a:r>
+            <a:br>
+              <a:rPr lang="en-US" dirty="0"/>
+            </a:br>
+            <a:r>
+              <a:rPr lang="en-US" sz="4400" dirty="0" smtClean="0"/>
+              <a:t>azuretraining@microsoft.com</a:t>
+            </a:r>
+            <a:endParaRPr lang="en-US" sz="4400" dirty="0"/>
+          </a:p>
+        </p:txBody>
+      </p:sp>
+    </p:spTree>
+    <p:extLst>
+      <p:ext uri="{BB962C8B-B14F-4D97-AF65-F5344CB8AC3E}">
+        <p14:creationId xmlns:p14="http://schemas.microsoft.com/office/powerpoint/2010/main" val="824160274"/>
+      </p:ext>
+    </p:extLst>
+  </p:cSld>
+  <p:clrMapOvr>
+    <a:masterClrMapping/>
+  </p:clrMapOvr>
+  <mc:AlternateContent xmlns:mc="http://schemas.openxmlformats.org/markup-compatibility/2006" xmlns:p14="http://schemas.microsoft.com/office/powerpoint/2010/main">
+    <mc:Choice Requires="p14">
+      <p:transition spd="med" p14:dur="700">
+        <p:fade/>
+      </p:transition>
+    </mc:Choice>
+    <mc:Fallback xmlns="">
+      <p:transition spd="med">
+        <p:fade/>
+      </p:transition>
+    </mc:Fallback>
+  </mc:AlternateContent>
+  <p:timing>
+    <p:tnLst>
+      <p:par>
+        <p:cTn id="1" dur="indefinite" restart="never" nodeType="tmRoot"/>
+      </p:par>
+    </p:tnLst>
+  </p:timing>
+</p:sld>
+</file>
+
+<file path=ppt/slides/slide11.xml><?xml version="1.0" encoding="utf-8"?>
+<p:sld xmlns:a="http://schemas.openxmlformats.org/drawingml/2006/main" xmlns:r="http://schemas.openxmlformats.org/officeDocument/2006/relationships" xmlns:p="http://schemas.openxmlformats.org/presentationml/2006/main">
+  <p:cSld>
+    <p:spTree>
+      <p:nvGrpSpPr>
+        <p:cNvPr id="1" name=""/>
+        <p:cNvGrpSpPr/>
+        <p:nvPr/>
+      </p:nvGrpSpPr>
+      <p:grpSpPr>
+        <a:xfrm>
+          <a:off x="0" y="0"/>
+          <a:ext cx="0" cy="0"/>
+          <a:chOff x="0" y="0"/>
+          <a:chExt cx="0" cy="0"/>
+        </a:xfrm>
+      </p:grpSpPr>
+      <p:sp>
+        <p:nvSpPr>
           <p:cNvPr id="4" name="Title 3"/>
           <p:cNvSpPr>
             <a:spLocks noGrp="1"/>
@@ -19729,7 +19913,7 @@
 </p:sld>
 </file>
 
-<file path=ppt/slides/slide11.xml><?xml version="1.0" encoding="utf-8"?>
+<file path=ppt/slides/slide12.xml><?xml version="1.0" encoding="utf-8"?>
 <p:sld xmlns:a="http://schemas.openxmlformats.org/drawingml/2006/main" xmlns:r="http://schemas.openxmlformats.org/officeDocument/2006/relationships" xmlns:p="http://schemas.openxmlformats.org/presentationml/2006/main">
   <p:cSld>
     <p:spTree>
@@ -21744,6 +21928,10 @@
               <a:t> </a:t>
             </a:r>
             <a:r>
+              <a:rPr lang="en-US" sz="2400" dirty="0" smtClean="0"/>
+              <a:t> </a:t>
+            </a:r>
+            <a:r>
               <a:rPr lang="en-US" sz="3200" dirty="0" smtClean="0"/>
               <a:t/>
             </a:r>
@@ -21818,6 +22006,234 @@
           <a:p>
             <a:r>
               <a:rPr lang="en-US" dirty="0" smtClean="0"/>
+              <a:t>Next </a:t>
+            </a:r>
+            <a:r>
+              <a:rPr lang="en-US" dirty="0" smtClean="0"/>
+              <a:t>Steps (Continued)</a:t>
+            </a:r>
+            <a:endParaRPr lang="en-US" dirty="0"/>
+          </a:p>
+        </p:txBody>
+      </p:sp>
+      <p:sp>
+        <p:nvSpPr>
+          <p:cNvPr id="3" name="Text Placeholder 2"/>
+          <p:cNvSpPr>
+            <a:spLocks noGrp="1"/>
+          </p:cNvSpPr>
+          <p:nvPr>
+            <p:ph type="body" sz="quarter" idx="10"/>
+          </p:nvPr>
+        </p:nvSpPr>
+        <p:spPr>
+          <a:xfrm>
+            <a:off x="519248" y="1247078"/>
+            <a:ext cx="11151917" cy="3337837"/>
+          </a:xfrm>
+        </p:spPr>
+        <p:txBody>
+          <a:bodyPr/>
+          <a:lstStyle/>
+          <a:p>
+            <a:pPr marL="574675" indent="-571500">
+              <a:buFont typeface="Arial" panose="020B0604020202020204" pitchFamily="34" charset="0"/>
+              <a:buChar char="•"/>
+            </a:pPr>
+            <a:r>
+              <a:rPr lang="en-US" sz="3600" dirty="0" smtClean="0"/>
+              <a:t>Windows Azure Training Kit For developers!</a:t>
+            </a:r>
+          </a:p>
+          <a:p>
+            <a:pPr marL="574675" indent="-571500">
+              <a:buFont typeface="Arial" panose="020B0604020202020204" pitchFamily="34" charset="0"/>
+              <a:buChar char="•"/>
+            </a:pPr>
+            <a:r>
+              <a:rPr lang="en-US" sz="3600" dirty="0">
+                <a:hlinkClick r:id="rId3"/>
+              </a:rPr>
+              <a:t>http://www.windowsazure.com/en-us/develop/net/other-resources/training-kit</a:t>
+            </a:r>
+            <a:r>
+              <a:rPr lang="en-US" sz="3600" dirty="0" smtClean="0">
+                <a:hlinkClick r:id="rId3"/>
+              </a:rPr>
+              <a:t>/</a:t>
+            </a:r>
+            <a:endParaRPr lang="en-US" sz="3600" dirty="0" smtClean="0"/>
+          </a:p>
+          <a:p>
+            <a:pPr marL="574675" indent="-571500">
+              <a:buFont typeface="Arial" panose="020B0604020202020204" pitchFamily="34" charset="0"/>
+              <a:buChar char="•"/>
+            </a:pPr>
+            <a:r>
+              <a:rPr lang="en-US" sz="3600" dirty="0" smtClean="0"/>
+              <a:t>More on Architecture, Reference, Best Practice, Code samples on WindowsAzure.com Developer Center.</a:t>
+            </a:r>
+          </a:p>
+          <a:p>
+            <a:pPr marL="574675" indent="-571500">
+              <a:buFont typeface="Arial" panose="020B0604020202020204" pitchFamily="34" charset="0"/>
+              <a:buChar char="•"/>
+            </a:pPr>
+            <a:endParaRPr lang="en-US" sz="3600" dirty="0"/>
+          </a:p>
+        </p:txBody>
+      </p:sp>
+      <p:sp>
+        <p:nvSpPr>
+          <p:cNvPr id="5" name="Rectangle 4"/>
+          <p:cNvSpPr/>
+          <p:nvPr/>
+        </p:nvSpPr>
+        <p:spPr bwMode="auto">
+          <a:xfrm>
+            <a:off x="5357542" y="4558598"/>
+            <a:ext cx="1343025" cy="314325"/>
+          </a:xfrm>
+          <a:prstGeom prst="rect">
+            <a:avLst/>
+          </a:prstGeom>
+          <a:noFill/>
+          <a:ln w="76200">
+            <a:solidFill>
+              <a:schemeClr val="accent5"/>
+            </a:solidFill>
+            <a:headEnd type="none" w="med" len="med"/>
+            <a:tailEnd type="none" w="med" len="med"/>
+          </a:ln>
+          <a:effectLst/>
+        </p:spPr>
+        <p:style>
+          <a:lnRef idx="1">
+            <a:schemeClr val="accent2"/>
+          </a:lnRef>
+          <a:fillRef idx="3">
+            <a:schemeClr val="accent2"/>
+          </a:fillRef>
+          <a:effectRef idx="2">
+            <a:schemeClr val="accent2"/>
+          </a:effectRef>
+          <a:fontRef idx="minor">
+            <a:schemeClr val="lt1"/>
+          </a:fontRef>
+        </p:style>
+        <p:txBody>
+          <a:bodyPr vert="horz" wrap="square" lIns="91436" tIns="45718" rIns="91436" bIns="45718" numCol="1" rtlCol="0" anchor="ctr" anchorCtr="0" compatLnSpc="1">
+            <a:prstTxWarp prst="textNoShape">
+              <a:avLst/>
+            </a:prstTxWarp>
+          </a:bodyPr>
+          <a:lstStyle/>
+          <a:p>
+            <a:pPr algn="ctr" defTabSz="914099" fontAlgn="base">
+              <a:spcBef>
+                <a:spcPct val="0"/>
+              </a:spcBef>
+              <a:spcAft>
+                <a:spcPct val="0"/>
+              </a:spcAft>
+            </a:pPr>
+            <a:endParaRPr lang="en-US" sz="2200" dirty="0" smtClean="0">
+              <a:gradFill>
+                <a:gsLst>
+                  <a:gs pos="0">
+                    <a:srgbClr val="FFFFFF"/>
+                  </a:gs>
+                  <a:gs pos="100000">
+                    <a:srgbClr val="FFFFFF"/>
+                  </a:gs>
+                </a:gsLst>
+                <a:lin ang="5400000" scaled="0"/>
+              </a:gradFill>
+            </a:endParaRPr>
+          </a:p>
+        </p:txBody>
+      </p:sp>
+      <p:pic>
+        <p:nvPicPr>
+          <p:cNvPr id="6" name="Picture 5"/>
+          <p:cNvPicPr>
+            <a:picLocks noChangeAspect="1"/>
+          </p:cNvPicPr>
+          <p:nvPr/>
+        </p:nvPicPr>
+        <p:blipFill>
+          <a:blip r:embed="rId4"/>
+          <a:stretch>
+            <a:fillRect/>
+          </a:stretch>
+        </p:blipFill>
+        <p:spPr>
+          <a:xfrm>
+            <a:off x="0" y="4114801"/>
+            <a:ext cx="12192000" cy="2743200"/>
+          </a:xfrm>
+          <a:prstGeom prst="rect">
+            <a:avLst/>
+          </a:prstGeom>
+        </p:spPr>
+      </p:pic>
+    </p:spTree>
+    <p:extLst>
+      <p:ext uri="{BB962C8B-B14F-4D97-AF65-F5344CB8AC3E}">
+        <p14:creationId xmlns:p14="http://schemas.microsoft.com/office/powerpoint/2010/main" val="918489967"/>
+      </p:ext>
+    </p:extLst>
+  </p:cSld>
+  <p:clrMapOvr>
+    <a:masterClrMapping/>
+  </p:clrMapOvr>
+  <p:transition>
+    <p:fade/>
+  </p:transition>
+  <p:timing>
+    <p:tnLst>
+      <p:par>
+        <p:cTn id="1" dur="indefinite" restart="never" nodeType="tmRoot"/>
+      </p:par>
+    </p:tnLst>
+  </p:timing>
+</p:sld>
+</file>
+
+<file path=ppt/slides/slide5.xml><?xml version="1.0" encoding="utf-8"?>
+<p:sld xmlns:a="http://schemas.openxmlformats.org/drawingml/2006/main" xmlns:r="http://schemas.openxmlformats.org/officeDocument/2006/relationships" xmlns:p="http://schemas.openxmlformats.org/presentationml/2006/main">
+  <p:cSld>
+    <p:spTree>
+      <p:nvGrpSpPr>
+        <p:cNvPr id="1" name=""/>
+        <p:cNvGrpSpPr/>
+        <p:nvPr/>
+      </p:nvGrpSpPr>
+      <p:grpSpPr>
+        <a:xfrm>
+          <a:off x="0" y="0"/>
+          <a:ext cx="0" cy="0"/>
+          <a:chOff x="0" y="0"/>
+          <a:chExt cx="0" cy="0"/>
+        </a:xfrm>
+      </p:grpSpPr>
+      <p:sp>
+        <p:nvSpPr>
+          <p:cNvPr id="2" name="Title 1"/>
+          <p:cNvSpPr>
+            <a:spLocks noGrp="1"/>
+          </p:cNvSpPr>
+          <p:nvPr>
+            <p:ph type="title"/>
+          </p:nvPr>
+        </p:nvSpPr>
+        <p:spPr/>
+        <p:txBody>
+          <a:bodyPr/>
+          <a:lstStyle/>
+          <a:p>
+            <a:r>
+              <a:rPr lang="en-US" dirty="0" smtClean="0"/>
               <a:t>Windows Azure Research Awards</a:t>
             </a:r>
             <a:endParaRPr lang="en-US" dirty="0"/>
@@ -22037,7 +22453,7 @@
 </p:sld>
 </file>
 
-<file path=ppt/slides/slide5.xml><?xml version="1.0" encoding="utf-8"?>
+<file path=ppt/slides/slide6.xml><?xml version="1.0" encoding="utf-8"?>
 <p:sld xmlns:a="http://schemas.openxmlformats.org/drawingml/2006/main" xmlns:r="http://schemas.openxmlformats.org/officeDocument/2006/relationships" xmlns:p="http://schemas.openxmlformats.org/presentationml/2006/main">
   <p:cSld>
     <p:spTree>
@@ -22272,7 +22688,7 @@
 </p:sld>
 </file>
 
-<file path=ppt/slides/slide6.xml><?xml version="1.0" encoding="utf-8"?>
+<file path=ppt/slides/slide7.xml><?xml version="1.0" encoding="utf-8"?>
 <p:sld xmlns:a="http://schemas.openxmlformats.org/drawingml/2006/main" xmlns:r="http://schemas.openxmlformats.org/officeDocument/2006/relationships" xmlns:p="http://schemas.openxmlformats.org/presentationml/2006/main">
   <p:cSld>
     <p:spTree>
@@ -22738,7 +23154,7 @@
 </p:sld>
 </file>
 
-<file path=ppt/slides/slide7.xml><?xml version="1.0" encoding="utf-8"?>
+<file path=ppt/slides/slide8.xml><?xml version="1.0" encoding="utf-8"?>
 <p:sld xmlns:a="http://schemas.openxmlformats.org/drawingml/2006/main" xmlns:r="http://schemas.openxmlformats.org/officeDocument/2006/relationships" xmlns:p="http://schemas.openxmlformats.org/presentationml/2006/main">
   <p:cSld>
     <p:spTree>
@@ -22826,83 +23242,6 @@
     <p:extLst>
       <p:ext uri="{BB962C8B-B14F-4D97-AF65-F5344CB8AC3E}">
         <p14:creationId xmlns:p14="http://schemas.microsoft.com/office/powerpoint/2010/main" val="2145700126"/>
-      </p:ext>
-    </p:extLst>
-  </p:cSld>
-  <p:clrMapOvr>
-    <a:masterClrMapping/>
-  </p:clrMapOvr>
-  <mc:AlternateContent xmlns:mc="http://schemas.openxmlformats.org/markup-compatibility/2006" xmlns:p14="http://schemas.microsoft.com/office/powerpoint/2010/main">
-    <mc:Choice Requires="p14">
-      <p:transition spd="med" p14:dur="700">
-        <p:fade/>
-      </p:transition>
-    </mc:Choice>
-    <mc:Fallback xmlns="">
-      <p:transition spd="med">
-        <p:fade/>
-      </p:transition>
-    </mc:Fallback>
-  </mc:AlternateContent>
-  <p:timing>
-    <p:tnLst>
-      <p:par>
-        <p:cTn id="1" dur="indefinite" restart="never" nodeType="tmRoot"/>
-      </p:par>
-    </p:tnLst>
-  </p:timing>
-</p:sld>
-</file>
-
-<file path=ppt/slides/slide8.xml><?xml version="1.0" encoding="utf-8"?>
-<p:sld xmlns:a="http://schemas.openxmlformats.org/drawingml/2006/main" xmlns:r="http://schemas.openxmlformats.org/officeDocument/2006/relationships" xmlns:p="http://schemas.openxmlformats.org/presentationml/2006/main">
-  <p:cSld>
-    <p:spTree>
-      <p:nvGrpSpPr>
-        <p:cNvPr id="1" name=""/>
-        <p:cNvGrpSpPr/>
-        <p:nvPr/>
-      </p:nvGrpSpPr>
-      <p:grpSpPr>
-        <a:xfrm>
-          <a:off x="0" y="0"/>
-          <a:ext cx="0" cy="0"/>
-          <a:chOff x="0" y="0"/>
-          <a:chExt cx="0" cy="0"/>
-        </a:xfrm>
-      </p:grpSpPr>
-      <p:sp>
-        <p:nvSpPr>
-          <p:cNvPr id="5" name="Title 4"/>
-          <p:cNvSpPr>
-            <a:spLocks noGrp="1"/>
-          </p:cNvSpPr>
-          <p:nvPr>
-            <p:ph type="ctrTitle"/>
-          </p:nvPr>
-        </p:nvSpPr>
-        <p:spPr>
-          <a:xfrm>
-            <a:off x="519248" y="2234114"/>
-            <a:ext cx="9843951" cy="1359196"/>
-          </a:xfrm>
-        </p:spPr>
-        <p:txBody>
-          <a:bodyPr/>
-          <a:lstStyle/>
-          <a:p>
-            <a:r>
-              <a:rPr lang="en-US" dirty="0" smtClean="0"/>
-              <a:t>Course evaluation survey</a:t>
-            </a:r>
-            <a:endParaRPr lang="en-US" dirty="0"/>
-          </a:p>
-        </p:txBody>
-      </p:sp>
-    </p:spTree>
-    <p:extLst>
-      <p:ext uri="{BB962C8B-B14F-4D97-AF65-F5344CB8AC3E}">
-        <p14:creationId xmlns:p14="http://schemas.microsoft.com/office/powerpoint/2010/main" val="2678890578"/>
       </p:ext>
     </p:extLst>
   </p:cSld>
@@ -22960,8 +23299,8 @@
         </p:nvSpPr>
         <p:spPr>
           <a:xfrm>
-            <a:off x="519249" y="3282328"/>
-            <a:ext cx="8375702" cy="1359196"/>
+            <a:off x="519248" y="2234114"/>
+            <a:ext cx="9843951" cy="1359196"/>
           </a:xfrm>
         </p:spPr>
         <p:txBody>
@@ -22970,38 +23309,16 @@
           <a:p>
             <a:r>
               <a:rPr lang="en-US" dirty="0" smtClean="0"/>
-              <a:t>Any final </a:t>
-            </a:r>
-            <a:r>
-              <a:rPr lang="en-US" dirty="0"/>
-              <a:t>q</a:t>
-            </a:r>
-            <a:r>
-              <a:rPr lang="en-US" dirty="0" smtClean="0"/>
-              <a:t>uestions?</a:t>
-            </a:r>
-            <a:br>
-              <a:rPr lang="en-US" dirty="0" smtClean="0"/>
-            </a:br>
-            <a:r>
-              <a:rPr lang="en-US" dirty="0"/>
-              <a:t/>
-            </a:r>
-            <a:br>
-              <a:rPr lang="en-US" dirty="0"/>
-            </a:br>
-            <a:r>
-              <a:rPr lang="en-US" sz="4400" dirty="0" smtClean="0"/>
-              <a:t>azuretraining@microsoft.com</a:t>
-            </a:r>
-            <a:endParaRPr lang="en-US" sz="4400" dirty="0"/>
+              <a:t>Course evaluation survey</a:t>
+            </a:r>
+            <a:endParaRPr lang="en-US" dirty="0"/>
           </a:p>
         </p:txBody>
       </p:sp>
     </p:spTree>
     <p:extLst>
       <p:ext uri="{BB962C8B-B14F-4D97-AF65-F5344CB8AC3E}">
-        <p14:creationId xmlns:p14="http://schemas.microsoft.com/office/powerpoint/2010/main" val="824160274"/>
+        <p14:creationId xmlns:p14="http://schemas.microsoft.com/office/powerpoint/2010/main" val="2678890578"/>
       </p:ext>
     </p:extLst>
   </p:cSld>

</xml_diff>